<commit_message>
Computer Vision: Image Augmentation
</commit_message>
<xml_diff>
--- a/Dive into Deep Learning/10. Computer Vision Image Augmentation-EN.pptx
+++ b/Dive into Deep Learning/10. Computer Vision Image Augmentation-EN.pptx
@@ -218,7 +218,7 @@
           <a:p>
             <a:fld id="{0D3578DB-0091-4EF0-9620-E708B7FBB15F}" type="datetimeFigureOut">
               <a:rPr lang="en-US" smtClean="0"/>
-              <a:t>11/11/2019</a:t>
+              <a:t>12/3/2019</a:t>
             </a:fld>
             <a:endParaRPr lang="en-US"/>
           </a:p>
@@ -3411,7 +3411,7 @@
           <a:p>
             <a:fld id="{23EC023D-B61A-4551-8136-DCD5A45A20F2}" type="datetimeFigureOut">
               <a:rPr lang="en-US" smtClean="0"/>
-              <a:t>11/11/2019</a:t>
+              <a:t>12/3/2019</a:t>
             </a:fld>
             <a:endParaRPr lang="en-US"/>
           </a:p>
@@ -3609,7 +3609,7 @@
           <a:p>
             <a:fld id="{23EC023D-B61A-4551-8136-DCD5A45A20F2}" type="datetimeFigureOut">
               <a:rPr lang="en-US" smtClean="0"/>
-              <a:t>11/11/2019</a:t>
+              <a:t>12/3/2019</a:t>
             </a:fld>
             <a:endParaRPr lang="en-US"/>
           </a:p>
@@ -3817,7 +3817,7 @@
           <a:p>
             <a:fld id="{23EC023D-B61A-4551-8136-DCD5A45A20F2}" type="datetimeFigureOut">
               <a:rPr lang="en-US" smtClean="0"/>
-              <a:t>11/11/2019</a:t>
+              <a:t>12/3/2019</a:t>
             </a:fld>
             <a:endParaRPr lang="en-US"/>
           </a:p>
@@ -5927,7 +5927,7 @@
           <a:p>
             <a:fld id="{23EC023D-B61A-4551-8136-DCD5A45A20F2}" type="datetimeFigureOut">
               <a:rPr lang="en-US" smtClean="0"/>
-              <a:t>11/11/2019</a:t>
+              <a:t>12/3/2019</a:t>
             </a:fld>
             <a:endParaRPr lang="en-US"/>
           </a:p>
@@ -6202,7 +6202,7 @@
           <a:p>
             <a:fld id="{23EC023D-B61A-4551-8136-DCD5A45A20F2}" type="datetimeFigureOut">
               <a:rPr lang="en-US" smtClean="0"/>
-              <a:t>11/11/2019</a:t>
+              <a:t>12/3/2019</a:t>
             </a:fld>
             <a:endParaRPr lang="en-US"/>
           </a:p>
@@ -6467,7 +6467,7 @@
           <a:p>
             <a:fld id="{23EC023D-B61A-4551-8136-DCD5A45A20F2}" type="datetimeFigureOut">
               <a:rPr lang="en-US" smtClean="0"/>
-              <a:t>11/11/2019</a:t>
+              <a:t>12/3/2019</a:t>
             </a:fld>
             <a:endParaRPr lang="en-US"/>
           </a:p>
@@ -6879,7 +6879,7 @@
           <a:p>
             <a:fld id="{23EC023D-B61A-4551-8136-DCD5A45A20F2}" type="datetimeFigureOut">
               <a:rPr lang="en-US" smtClean="0"/>
-              <a:t>11/11/2019</a:t>
+              <a:t>12/3/2019</a:t>
             </a:fld>
             <a:endParaRPr lang="en-US"/>
           </a:p>
@@ -7020,7 +7020,7 @@
           <a:p>
             <a:fld id="{23EC023D-B61A-4551-8136-DCD5A45A20F2}" type="datetimeFigureOut">
               <a:rPr lang="en-US" smtClean="0"/>
-              <a:t>11/11/2019</a:t>
+              <a:t>12/3/2019</a:t>
             </a:fld>
             <a:endParaRPr lang="en-US"/>
           </a:p>
@@ -7133,7 +7133,7 @@
           <a:p>
             <a:fld id="{23EC023D-B61A-4551-8136-DCD5A45A20F2}" type="datetimeFigureOut">
               <a:rPr lang="en-US" smtClean="0"/>
-              <a:t>11/11/2019</a:t>
+              <a:t>12/3/2019</a:t>
             </a:fld>
             <a:endParaRPr lang="en-US"/>
           </a:p>
@@ -7444,7 +7444,7 @@
           <a:p>
             <a:fld id="{23EC023D-B61A-4551-8136-DCD5A45A20F2}" type="datetimeFigureOut">
               <a:rPr lang="en-US" smtClean="0"/>
-              <a:t>11/11/2019</a:t>
+              <a:t>12/3/2019</a:t>
             </a:fld>
             <a:endParaRPr lang="en-US"/>
           </a:p>
@@ -7732,7 +7732,7 @@
           <a:p>
             <a:fld id="{23EC023D-B61A-4551-8136-DCD5A45A20F2}" type="datetimeFigureOut">
               <a:rPr lang="en-US" smtClean="0"/>
-              <a:t>11/11/2019</a:t>
+              <a:t>12/3/2019</a:t>
             </a:fld>
             <a:endParaRPr lang="en-US"/>
           </a:p>
@@ -7973,7 +7973,7 @@
           <a:p>
             <a:fld id="{23EC023D-B61A-4551-8136-DCD5A45A20F2}" type="datetimeFigureOut">
               <a:rPr lang="en-US" smtClean="0"/>
-              <a:t>11/11/2019</a:t>
+              <a:t>12/3/2019</a:t>
             </a:fld>
             <a:endParaRPr lang="en-US"/>
           </a:p>
@@ -8493,8 +8493,8 @@
               <a:t> </a:t>
             </a:r>
             <a:r>
-              <a:rPr lang="en-US" altLang="zh-CN" dirty="0" err="1"/>
-              <a:t>Augumentation</a:t>
+              <a:rPr lang="en-US" altLang="zh-CN" dirty="0"/>
+              <a:t>Augmentation</a:t>
             </a:r>
             <a:endParaRPr lang="zh-CN" altLang="en-US" dirty="0"/>
           </a:p>

</xml_diff>